<commit_message>
Update Final.sql file and add plots
</commit_message>
<xml_diff>
--- a/Presentation.pptx
+++ b/Presentation.pptx
@@ -260,7 +260,7 @@
           <a:p>
             <a:fld id="{D64562E9-40B1-456F-8B97-81B50FCD1D8E}" type="datetimeFigureOut">
               <a:rPr lang="en-US" smtClean="0"/>
-              <a:t>2022-12-02</a:t>
+              <a:t>2022-12-06</a:t>
             </a:fld>
             <a:endParaRPr lang="en-US"/>
           </a:p>
@@ -458,7 +458,7 @@
           <a:p>
             <a:fld id="{D64562E9-40B1-456F-8B97-81B50FCD1D8E}" type="datetimeFigureOut">
               <a:rPr lang="en-US" smtClean="0"/>
-              <a:t>2022-12-02</a:t>
+              <a:t>2022-12-06</a:t>
             </a:fld>
             <a:endParaRPr lang="en-US"/>
           </a:p>
@@ -666,7 +666,7 @@
           <a:p>
             <a:fld id="{D64562E9-40B1-456F-8B97-81B50FCD1D8E}" type="datetimeFigureOut">
               <a:rPr lang="en-US" smtClean="0"/>
-              <a:t>2022-12-02</a:t>
+              <a:t>2022-12-06</a:t>
             </a:fld>
             <a:endParaRPr lang="en-US"/>
           </a:p>
@@ -864,7 +864,7 @@
           <a:p>
             <a:fld id="{D64562E9-40B1-456F-8B97-81B50FCD1D8E}" type="datetimeFigureOut">
               <a:rPr lang="en-US" smtClean="0"/>
-              <a:t>2022-12-02</a:t>
+              <a:t>2022-12-06</a:t>
             </a:fld>
             <a:endParaRPr lang="en-US"/>
           </a:p>
@@ -1139,7 +1139,7 @@
           <a:p>
             <a:fld id="{D64562E9-40B1-456F-8B97-81B50FCD1D8E}" type="datetimeFigureOut">
               <a:rPr lang="en-US" smtClean="0"/>
-              <a:t>2022-12-02</a:t>
+              <a:t>2022-12-06</a:t>
             </a:fld>
             <a:endParaRPr lang="en-US"/>
           </a:p>
@@ -1404,7 +1404,7 @@
           <a:p>
             <a:fld id="{D64562E9-40B1-456F-8B97-81B50FCD1D8E}" type="datetimeFigureOut">
               <a:rPr lang="en-US" smtClean="0"/>
-              <a:t>2022-12-02</a:t>
+              <a:t>2022-12-06</a:t>
             </a:fld>
             <a:endParaRPr lang="en-US"/>
           </a:p>
@@ -1816,7 +1816,7 @@
           <a:p>
             <a:fld id="{D64562E9-40B1-456F-8B97-81B50FCD1D8E}" type="datetimeFigureOut">
               <a:rPr lang="en-US" smtClean="0"/>
-              <a:t>2022-12-02</a:t>
+              <a:t>2022-12-06</a:t>
             </a:fld>
             <a:endParaRPr lang="en-US"/>
           </a:p>
@@ -1957,7 +1957,7 @@
           <a:p>
             <a:fld id="{D64562E9-40B1-456F-8B97-81B50FCD1D8E}" type="datetimeFigureOut">
               <a:rPr lang="en-US" smtClean="0"/>
-              <a:t>2022-12-02</a:t>
+              <a:t>2022-12-06</a:t>
             </a:fld>
             <a:endParaRPr lang="en-US"/>
           </a:p>
@@ -2070,7 +2070,7 @@
           <a:p>
             <a:fld id="{D64562E9-40B1-456F-8B97-81B50FCD1D8E}" type="datetimeFigureOut">
               <a:rPr lang="en-US" smtClean="0"/>
-              <a:t>2022-12-02</a:t>
+              <a:t>2022-12-06</a:t>
             </a:fld>
             <a:endParaRPr lang="en-US"/>
           </a:p>
@@ -2381,7 +2381,7 @@
           <a:p>
             <a:fld id="{D64562E9-40B1-456F-8B97-81B50FCD1D8E}" type="datetimeFigureOut">
               <a:rPr lang="en-US" smtClean="0"/>
-              <a:t>2022-12-02</a:t>
+              <a:t>2022-12-06</a:t>
             </a:fld>
             <a:endParaRPr lang="en-US"/>
           </a:p>
@@ -2669,7 +2669,7 @@
           <a:p>
             <a:fld id="{D64562E9-40B1-456F-8B97-81B50FCD1D8E}" type="datetimeFigureOut">
               <a:rPr lang="en-US" smtClean="0"/>
-              <a:t>2022-12-02</a:t>
+              <a:t>2022-12-06</a:t>
             </a:fld>
             <a:endParaRPr lang="en-US"/>
           </a:p>
@@ -2910,7 +2910,7 @@
           <a:p>
             <a:fld id="{D64562E9-40B1-456F-8B97-81B50FCD1D8E}" type="datetimeFigureOut">
               <a:rPr lang="en-US" smtClean="0"/>
-              <a:t>2022-12-02</a:t>
+              <a:t>2022-12-06</a:t>
             </a:fld>
             <a:endParaRPr lang="en-US"/>
           </a:p>
@@ -3487,13 +3487,18 @@
               <a:buNone/>
             </a:pPr>
             <a:r>
-              <a:rPr lang="en-US" sz="4000" b="1" u="sng" dirty="0">
+              <a:rPr lang="en-US" sz="4000" b="1" u="sng">
                 <a:solidFill>
                   <a:srgbClr val="FF0000"/>
                 </a:solidFill>
               </a:rPr>
-              <a:t>Subjects:</a:t>
-            </a:r>
+              <a:t>Agenda:</a:t>
+            </a:r>
+            <a:endParaRPr lang="en-US" sz="4000" b="1" u="sng" dirty="0">
+              <a:solidFill>
+                <a:srgbClr val="FF0000"/>
+              </a:solidFill>
+            </a:endParaRPr>
           </a:p>
           <a:p>
             <a:pPr marL="0" indent="0">

</xml_diff>